<commit_message>
Feat(chp6): Ajout des imports et exercices
Rédaction de la méthode d'important from module import ...

Rédaction des exercices

Export du ours en pdf
</commit_message>
<xml_diff>
--- a/source/Chapitre 6 - Les modules.pptx
+++ b/source/Chapitre 6 - Les modules.pptx
@@ -15,8 +15,8 @@
     <p:sldId id="300" r:id="rId6"/>
     <p:sldId id="298" r:id="rId7"/>
     <p:sldId id="301" r:id="rId8"/>
-    <p:sldId id="299" r:id="rId9"/>
-    <p:sldId id="296" r:id="rId10"/>
+    <p:sldId id="296" r:id="rId9"/>
+    <p:sldId id="302" r:id="rId10"/>
     <p:sldId id="284" r:id="rId11"/>
   </p:sldIdLst>
   <p:sldSz cx="12192000" cy="6858000"/>
@@ -127,7 +127,7 @@
 <file path=ppt/revisionInfo.xml><?xml version="1.0" encoding="utf-8"?>
 <p1510:revInfo xmlns:a="http://schemas.openxmlformats.org/drawingml/2006/main" xmlns:r="http://schemas.openxmlformats.org/officeDocument/2006/relationships" xmlns:p1510="http://schemas.microsoft.com/office/powerpoint/2015/10/main">
   <p1510:revLst>
-    <p1510:client id="{A4091A3B-AF17-426D-A8E9-B493EC6BFBB7}" v="23" dt="2023-10-01T15:54:36.666"/>
+    <p1510:client id="{A4091A3B-AF17-426D-A8E9-B493EC6BFBB7}" v="27" dt="2023-10-14T13:45:05.353"/>
   </p1510:revLst>
 </p1510:revInfo>
 </file>
@@ -137,7 +137,7 @@
   <pc:docChgLst>
     <pc:chgData name="Ismaël Tuo" userId="fca7baf0e513a1e6" providerId="LiveId" clId="{A4091A3B-AF17-426D-A8E9-B493EC6BFBB7}"/>
     <pc:docChg chg="undo custSel addSld delSld modSld">
-      <pc:chgData name="Ismaël Tuo" userId="fca7baf0e513a1e6" providerId="LiveId" clId="{A4091A3B-AF17-426D-A8E9-B493EC6BFBB7}" dt="2023-10-01T16:02:42.021" v="3264" actId="1076"/>
+      <pc:chgData name="Ismaël Tuo" userId="fca7baf0e513a1e6" providerId="LiveId" clId="{A4091A3B-AF17-426D-A8E9-B493EC6BFBB7}" dt="2023-10-14T13:53:54.207" v="6642" actId="20577"/>
       <pc:docMkLst>
         <pc:docMk/>
       </pc:docMkLst>
@@ -172,13 +172,13 @@
         </pc:spChg>
       </pc:sldChg>
       <pc:sldChg chg="modSp mod">
-        <pc:chgData name="Ismaël Tuo" userId="fca7baf0e513a1e6" providerId="LiveId" clId="{A4091A3B-AF17-426D-A8E9-B493EC6BFBB7}" dt="2023-10-01T15:45:23.564" v="2079" actId="20577"/>
+        <pc:chgData name="Ismaël Tuo" userId="fca7baf0e513a1e6" providerId="LiveId" clId="{A4091A3B-AF17-426D-A8E9-B493EC6BFBB7}" dt="2023-10-14T13:28:38.430" v="3787" actId="20577"/>
         <pc:sldMkLst>
           <pc:docMk/>
           <pc:sldMk cId="1268069196" sldId="285"/>
         </pc:sldMkLst>
         <pc:spChg chg="mod">
-          <ac:chgData name="Ismaël Tuo" userId="fca7baf0e513a1e6" providerId="LiveId" clId="{A4091A3B-AF17-426D-A8E9-B493EC6BFBB7}" dt="2023-10-01T15:45:23.564" v="2079" actId="20577"/>
+          <ac:chgData name="Ismaël Tuo" userId="fca7baf0e513a1e6" providerId="LiveId" clId="{A4091A3B-AF17-426D-A8E9-B493EC6BFBB7}" dt="2023-10-14T13:28:38.430" v="3787" actId="20577"/>
           <ac:spMkLst>
             <pc:docMk/>
             <pc:sldMk cId="1268069196" sldId="285"/>
@@ -392,18 +392,26 @@
           <pc:sldMk cId="4049529178" sldId="295"/>
         </pc:sldMkLst>
       </pc:sldChg>
-      <pc:sldChg chg="delSp modSp mod">
-        <pc:chgData name="Ismaël Tuo" userId="fca7baf0e513a1e6" providerId="LiveId" clId="{A4091A3B-AF17-426D-A8E9-B493EC6BFBB7}" dt="2023-10-01T15:09:17.977" v="17" actId="478"/>
+      <pc:sldChg chg="addSp delSp modSp mod">
+        <pc:chgData name="Ismaël Tuo" userId="fca7baf0e513a1e6" providerId="LiveId" clId="{A4091A3B-AF17-426D-A8E9-B493EC6BFBB7}" dt="2023-10-14T13:42:39.620" v="5040" actId="20577"/>
         <pc:sldMkLst>
           <pc:docMk/>
           <pc:sldMk cId="335285156" sldId="296"/>
         </pc:sldMkLst>
         <pc:spChg chg="mod">
-          <ac:chgData name="Ismaël Tuo" userId="fca7baf0e513a1e6" providerId="LiveId" clId="{A4091A3B-AF17-426D-A8E9-B493EC6BFBB7}" dt="2023-10-01T15:09:09.129" v="13" actId="20577"/>
+          <ac:chgData name="Ismaël Tuo" userId="fca7baf0e513a1e6" providerId="LiveId" clId="{A4091A3B-AF17-426D-A8E9-B493EC6BFBB7}" dt="2023-10-14T13:42:39.620" v="5040" actId="20577"/>
           <ac:spMkLst>
             <pc:docMk/>
             <pc:sldMk cId="335285156" sldId="296"/>
             <ac:spMk id="2" creationId="{30762B68-20AD-E048-3AB2-67EF1C3DE0A6}"/>
+          </ac:spMkLst>
+        </pc:spChg>
+        <pc:spChg chg="add mod">
+          <ac:chgData name="Ismaël Tuo" userId="fca7baf0e513a1e6" providerId="LiveId" clId="{A4091A3B-AF17-426D-A8E9-B493EC6BFBB7}" dt="2023-10-14T13:38:56.495" v="5036"/>
+          <ac:spMkLst>
+            <pc:docMk/>
+            <pc:sldMk cId="335285156" sldId="296"/>
+            <ac:spMk id="7" creationId="{13C076C3-6118-3631-AFD0-D74872C44830}"/>
           </ac:spMkLst>
         </pc:spChg>
         <pc:spChg chg="del mod">
@@ -651,8 +659,8 @@
           </ac:picMkLst>
         </pc:picChg>
       </pc:sldChg>
-      <pc:sldChg chg="modSp add mod">
-        <pc:chgData name="Ismaël Tuo" userId="fca7baf0e513a1e6" providerId="LiveId" clId="{A4091A3B-AF17-426D-A8E9-B493EC6BFBB7}" dt="2023-10-01T15:27:17.415" v="911" actId="14100"/>
+      <pc:sldChg chg="modSp add del mod">
+        <pc:chgData name="Ismaël Tuo" userId="fca7baf0e513a1e6" providerId="LiveId" clId="{A4091A3B-AF17-426D-A8E9-B493EC6BFBB7}" dt="2023-10-14T13:28:28.030" v="3754" actId="47"/>
         <pc:sldMkLst>
           <pc:docMk/>
           <pc:sldMk cId="3830825058" sldId="299"/>
@@ -705,20 +713,99 @@
           </ac:picMkLst>
         </pc:picChg>
       </pc:sldChg>
-      <pc:sldChg chg="modSp add mod">
-        <pc:chgData name="Ismaël Tuo" userId="fca7baf0e513a1e6" providerId="LiveId" clId="{A4091A3B-AF17-426D-A8E9-B493EC6BFBB7}" dt="2023-10-01T16:01:58.289" v="3263" actId="20577"/>
+      <pc:sldChg chg="addSp modSp add mod">
+        <pc:chgData name="Ismaël Tuo" userId="fca7baf0e513a1e6" providerId="LiveId" clId="{A4091A3B-AF17-426D-A8E9-B493EC6BFBB7}" dt="2023-10-14T13:10:13.011" v="3753" actId="1076"/>
         <pc:sldMkLst>
           <pc:docMk/>
           <pc:sldMk cId="1612634069" sldId="301"/>
         </pc:sldMkLst>
+        <pc:spChg chg="add mod">
+          <ac:chgData name="Ismaël Tuo" userId="fca7baf0e513a1e6" providerId="LiveId" clId="{A4091A3B-AF17-426D-A8E9-B493EC6BFBB7}" dt="2023-10-14T13:02:25.012" v="3608" actId="20577"/>
+          <ac:spMkLst>
+            <pc:docMk/>
+            <pc:sldMk cId="1612634069" sldId="301"/>
+            <ac:spMk id="2" creationId="{EBE7FC7C-0EA4-18FA-DE8E-0EA27EDE766D}"/>
+          </ac:spMkLst>
+        </pc:spChg>
+        <pc:spChg chg="add mod">
+          <ac:chgData name="Ismaël Tuo" userId="fca7baf0e513a1e6" providerId="LiveId" clId="{A4091A3B-AF17-426D-A8E9-B493EC6BFBB7}" dt="2023-10-14T13:08:23.921" v="3741" actId="1076"/>
+          <ac:spMkLst>
+            <pc:docMk/>
+            <pc:sldMk cId="1612634069" sldId="301"/>
+            <ac:spMk id="7" creationId="{D916796E-8CEE-64BD-CD10-DEE4A66713D5}"/>
+          </ac:spMkLst>
+        </pc:spChg>
         <pc:spChg chg="mod">
-          <ac:chgData name="Ismaël Tuo" userId="fca7baf0e513a1e6" providerId="LiveId" clId="{A4091A3B-AF17-426D-A8E9-B493EC6BFBB7}" dt="2023-10-01T16:01:58.289" v="3263" actId="20577"/>
+          <ac:chgData name="Ismaël Tuo" userId="fca7baf0e513a1e6" providerId="LiveId" clId="{A4091A3B-AF17-426D-A8E9-B493EC6BFBB7}" dt="2023-10-14T13:10:13.011" v="3753" actId="1076"/>
           <ac:spMkLst>
             <pc:docMk/>
             <pc:sldMk cId="1612634069" sldId="301"/>
             <ac:spMk id="22" creationId="{C3926A1A-9664-733A-6ADF-C5B314D8B1F9}"/>
           </ac:spMkLst>
         </pc:spChg>
+        <pc:picChg chg="add mod">
+          <ac:chgData name="Ismaël Tuo" userId="fca7baf0e513a1e6" providerId="LiveId" clId="{A4091A3B-AF17-426D-A8E9-B493EC6BFBB7}" dt="2023-10-14T13:08:50.853" v="3749" actId="1076"/>
+          <ac:picMkLst>
+            <pc:docMk/>
+            <pc:sldMk cId="1612634069" sldId="301"/>
+            <ac:picMk id="9" creationId="{A170EE43-EB7A-0426-AFEC-683F04558707}"/>
+          </ac:picMkLst>
+        </pc:picChg>
+        <pc:picChg chg="add mod">
+          <ac:chgData name="Ismaël Tuo" userId="fca7baf0e513a1e6" providerId="LiveId" clId="{A4091A3B-AF17-426D-A8E9-B493EC6BFBB7}" dt="2023-10-14T13:08:53.014" v="3750" actId="1076"/>
+          <ac:picMkLst>
+            <pc:docMk/>
+            <pc:sldMk cId="1612634069" sldId="301"/>
+            <ac:picMk id="11" creationId="{FCD650A7-20E0-E221-85EF-17D95B233D80}"/>
+          </ac:picMkLst>
+        </pc:picChg>
+        <pc:picChg chg="add mod">
+          <ac:chgData name="Ismaël Tuo" userId="fca7baf0e513a1e6" providerId="LiveId" clId="{A4091A3B-AF17-426D-A8E9-B493EC6BFBB7}" dt="2023-10-14T13:10:09.419" v="3752" actId="1076"/>
+          <ac:picMkLst>
+            <pc:docMk/>
+            <pc:sldMk cId="1612634069" sldId="301"/>
+            <ac:picMk id="13" creationId="{B2FFBF53-8D4A-8D9F-E91D-805869DAE900}"/>
+          </ac:picMkLst>
+        </pc:picChg>
+      </pc:sldChg>
+      <pc:sldChg chg="addSp modSp add mod">
+        <pc:chgData name="Ismaël Tuo" userId="fca7baf0e513a1e6" providerId="LiveId" clId="{A4091A3B-AF17-426D-A8E9-B493EC6BFBB7}" dt="2023-10-14T13:53:54.207" v="6642" actId="20577"/>
+        <pc:sldMkLst>
+          <pc:docMk/>
+          <pc:sldMk cId="116532967" sldId="302"/>
+        </pc:sldMkLst>
+        <pc:spChg chg="mod">
+          <ac:chgData name="Ismaël Tuo" userId="fca7baf0e513a1e6" providerId="LiveId" clId="{A4091A3B-AF17-426D-A8E9-B493EC6BFBB7}" dt="2023-10-14T13:43:00.321" v="5043" actId="20577"/>
+          <ac:spMkLst>
+            <pc:docMk/>
+            <pc:sldMk cId="116532967" sldId="302"/>
+            <ac:spMk id="2" creationId="{30762B68-20AD-E048-3AB2-67EF1C3DE0A6}"/>
+          </ac:spMkLst>
+        </pc:spChg>
+        <pc:spChg chg="mod">
+          <ac:chgData name="Ismaël Tuo" userId="fca7baf0e513a1e6" providerId="LiveId" clId="{A4091A3B-AF17-426D-A8E9-B493EC6BFBB7}" dt="2023-10-14T13:50:01.234" v="6082" actId="1076"/>
+          <ac:spMkLst>
+            <pc:docMk/>
+            <pc:sldMk cId="116532967" sldId="302"/>
+            <ac:spMk id="7" creationId="{13C076C3-6118-3631-AFD0-D74872C44830}"/>
+          </ac:spMkLst>
+        </pc:spChg>
+        <pc:spChg chg="add mod">
+          <ac:chgData name="Ismaël Tuo" userId="fca7baf0e513a1e6" providerId="LiveId" clId="{A4091A3B-AF17-426D-A8E9-B493EC6BFBB7}" dt="2023-10-14T13:53:54.207" v="6642" actId="20577"/>
+          <ac:spMkLst>
+            <pc:docMk/>
+            <pc:sldMk cId="116532967" sldId="302"/>
+            <ac:spMk id="10" creationId="{D9083776-7EAD-5F3A-5C5B-F8F7EECBD3BE}"/>
+          </ac:spMkLst>
+        </pc:spChg>
+        <pc:picChg chg="add mod">
+          <ac:chgData name="Ismaël Tuo" userId="fca7baf0e513a1e6" providerId="LiveId" clId="{A4091A3B-AF17-426D-A8E9-B493EC6BFBB7}" dt="2023-10-14T13:50:04.699" v="6083" actId="1076"/>
+          <ac:picMkLst>
+            <pc:docMk/>
+            <pc:sldMk cId="116532967" sldId="302"/>
+            <ac:picMk id="9" creationId="{788D8C41-4AB6-1A52-C725-980EB49C08BA}"/>
+          </ac:picMkLst>
+        </pc:picChg>
       </pc:sldChg>
     </pc:docChg>
   </pc:docChgLst>
@@ -807,7 +894,7 @@
           <a:p>
             <a:fld id="{5D1B8971-FAD5-A544-A565-5C81831E2E08}" type="datetimeFigureOut">
               <a:rPr lang="fr-FR" smtClean="0"/>
-              <a:t>01/10/2023</a:t>
+              <a:t>14/10/2023</a:t>
             </a:fld>
             <a:endParaRPr lang="fr-FR"/>
           </a:p>
@@ -1237,7 +1324,7 @@
           <a:p>
             <a:fld id="{446AF453-C717-E044-9B61-C449088DBB9F}" type="datetime1">
               <a:rPr lang="fr-FR" smtClean="0"/>
-              <a:t>01/10/2023</a:t>
+              <a:t>14/10/2023</a:t>
             </a:fld>
             <a:endParaRPr lang="fr-FR"/>
           </a:p>
@@ -1411,7 +1498,7 @@
           <a:p>
             <a:fld id="{0AD74B8B-4B66-A54B-A7E1-EB9F6C09CE67}" type="datetime1">
               <a:rPr lang="fr-FR" smtClean="0"/>
-              <a:t>01/10/2023</a:t>
+              <a:t>14/10/2023</a:t>
             </a:fld>
             <a:endParaRPr lang="fr-FR"/>
           </a:p>
@@ -1595,7 +1682,7 @@
           <a:p>
             <a:fld id="{9584F9F2-42A0-CD42-8013-986AEAF97421}" type="datetime1">
               <a:rPr lang="fr-FR" smtClean="0"/>
-              <a:t>01/10/2023</a:t>
+              <a:t>14/10/2023</a:t>
             </a:fld>
             <a:endParaRPr lang="fr-FR"/>
           </a:p>
@@ -1769,7 +1856,7 @@
           <a:p>
             <a:fld id="{DAB9BD9F-3179-BB4C-96AB-C40862581685}" type="datetime1">
               <a:rPr lang="fr-FR" smtClean="0"/>
-              <a:t>01/10/2023</a:t>
+              <a:t>14/10/2023</a:t>
             </a:fld>
             <a:endParaRPr lang="fr-FR"/>
           </a:p>
@@ -2041,7 +2128,7 @@
           <a:p>
             <a:fld id="{A664DE96-64FF-BC43-8A9C-18ED43A528D6}" type="datetime1">
               <a:rPr lang="fr-FR" smtClean="0"/>
-              <a:t>01/10/2023</a:t>
+              <a:t>14/10/2023</a:t>
             </a:fld>
             <a:endParaRPr lang="fr-FR"/>
           </a:p>
@@ -2277,7 +2364,7 @@
           <a:p>
             <a:fld id="{2C8FE800-9F9B-1C4F-A1CD-9EF46842C4CA}" type="datetime1">
               <a:rPr lang="fr-FR" smtClean="0"/>
-              <a:t>01/10/2023</a:t>
+              <a:t>14/10/2023</a:t>
             </a:fld>
             <a:endParaRPr lang="fr-FR"/>
           </a:p>
@@ -2640,7 +2727,7 @@
           <a:p>
             <a:fld id="{0F7DED4E-8CB4-EF40-A349-EFC02EC7784E}" type="datetime1">
               <a:rPr lang="fr-FR" smtClean="0"/>
-              <a:t>01/10/2023</a:t>
+              <a:t>14/10/2023</a:t>
             </a:fld>
             <a:endParaRPr lang="fr-FR"/>
           </a:p>
@@ -2785,7 +2872,7 @@
           <a:p>
             <a:fld id="{5BB88D77-E8A2-E24F-81D2-817E60779F3E}" type="datetime1">
               <a:rPr lang="fr-FR" smtClean="0"/>
-              <a:t>01/10/2023</a:t>
+              <a:t>14/10/2023</a:t>
             </a:fld>
             <a:endParaRPr lang="fr-FR"/>
           </a:p>
@@ -2884,7 +2971,7 @@
           <a:p>
             <a:fld id="{817F964E-5B57-884A-A1B8-925BFA5276AF}" type="datetime1">
               <a:rPr lang="fr-FR" smtClean="0"/>
-              <a:t>01/10/2023</a:t>
+              <a:t>14/10/2023</a:t>
             </a:fld>
             <a:endParaRPr lang="fr-FR"/>
           </a:p>
@@ -3245,7 +3332,7 @@
           <a:p>
             <a:fld id="{D5636CD0-A2E6-1543-A0E5-C829C16FEE55}" type="datetime1">
               <a:rPr lang="fr-FR" smtClean="0"/>
-              <a:t>01/10/2023</a:t>
+              <a:t>14/10/2023</a:t>
             </a:fld>
             <a:endParaRPr lang="fr-FR"/>
           </a:p>
@@ -3606,7 +3693,7 @@
           <a:p>
             <a:fld id="{CEE5CE4A-5B1A-1846-BA66-722BDB7A9525}" type="datetime1">
               <a:rPr lang="fr-FR" smtClean="0"/>
-              <a:t>01/10/2023</a:t>
+              <a:t>14/10/2023</a:t>
             </a:fld>
             <a:endParaRPr lang="fr-FR"/>
           </a:p>
@@ -3853,7 +3940,7 @@
           <a:p>
             <a:fld id="{55A13D9C-CA6E-9C45-8634-4423EBFFD553}" type="datetime1">
               <a:rPr lang="fr-FR" smtClean="0"/>
-              <a:t>01/10/2023</a:t>
+              <a:t>14/10/2023</a:t>
             </a:fld>
             <a:endParaRPr lang="fr-FR"/>
           </a:p>
@@ -4957,8 +5044,8 @@
         </p:nvSpPr>
         <p:spPr>
           <a:xfrm>
-            <a:off x="500932" y="912418"/>
-            <a:ext cx="9192515" cy="3046988"/>
+            <a:off x="500932" y="993899"/>
+            <a:ext cx="9192515" cy="2677656"/>
           </a:xfrm>
           <a:prstGeom prst="rect">
             <a:avLst/>
@@ -5068,24 +5155,6 @@
                 <a:latin typeface="Times New Roman" panose="02020603050405020304" pitchFamily="18" charset="0"/>
                 <a:cs typeface="Times New Roman" panose="02020603050405020304" pitchFamily="18" charset="0"/>
                 <a:hlinkClick r:id="rId6" action="ppaction://hlinksldjump"/>
-              </a:rPr>
-              <a:t>Exemple de création de module</a:t>
-            </a:r>
-            <a:endParaRPr lang="fr-FR" sz="2400" dirty="0">
-              <a:latin typeface="Times New Roman" panose="02020603050405020304" pitchFamily="18" charset="0"/>
-              <a:cs typeface="Times New Roman" panose="02020603050405020304" pitchFamily="18" charset="0"/>
-            </a:endParaRPr>
-          </a:p>
-          <a:p>
-            <a:pPr marL="342900" indent="-342900">
-              <a:buFont typeface="+mj-lt"/>
-              <a:buAutoNum type="arabicPeriod"/>
-            </a:pPr>
-            <a:r>
-              <a:rPr lang="fr-FR" sz="2400" dirty="0">
-                <a:latin typeface="Times New Roman" panose="02020603050405020304" pitchFamily="18" charset="0"/>
-                <a:cs typeface="Times New Roman" panose="02020603050405020304" pitchFamily="18" charset="0"/>
-                <a:hlinkClick r:id="rId7" action="ppaction://hlinksldjump"/>
               </a:rPr>
               <a:t>Exercices</a:t>
             </a:r>
@@ -7316,7 +7385,7 @@
         <p:spPr>
           <a:xfrm>
             <a:off x="500932" y="896114"/>
-            <a:ext cx="11088982" cy="400110"/>
+            <a:ext cx="11088982" cy="707886"/>
           </a:xfrm>
           <a:prstGeom prst="rect">
             <a:avLst/>
@@ -7341,11 +7410,272 @@
                 <a:latin typeface="Times New Roman" panose="02020603050405020304" pitchFamily="18" charset="0"/>
                 <a:cs typeface="Times New Roman" panose="02020603050405020304" pitchFamily="18" charset="0"/>
               </a:rPr>
-              <a:t>Page 52</a:t>
-            </a:r>
-          </a:p>
-        </p:txBody>
-      </p:sp>
+              <a:t>Parfois, on a juste besoin d’importer un nombre restreint de fonctions d’un module dans ce cas on utilise la syntaxe </a:t>
+            </a:r>
+            <a:r>
+              <a:rPr lang="fr-FR" b="1" dirty="0" err="1">
+                <a:latin typeface="Times New Roman" panose="02020603050405020304" pitchFamily="18" charset="0"/>
+                <a:cs typeface="Times New Roman" panose="02020603050405020304" pitchFamily="18" charset="0"/>
+              </a:rPr>
+              <a:t>from</a:t>
+            </a:r>
+            <a:r>
+              <a:rPr lang="fr-FR" b="1" dirty="0">
+                <a:latin typeface="Times New Roman" panose="02020603050405020304" pitchFamily="18" charset="0"/>
+                <a:cs typeface="Times New Roman" panose="02020603050405020304" pitchFamily="18" charset="0"/>
+              </a:rPr>
+              <a:t> </a:t>
+            </a:r>
+            <a:r>
+              <a:rPr lang="fr-FR" b="1" dirty="0" err="1">
+                <a:latin typeface="Times New Roman" panose="02020603050405020304" pitchFamily="18" charset="0"/>
+                <a:cs typeface="Times New Roman" panose="02020603050405020304" pitchFamily="18" charset="0"/>
+              </a:rPr>
+              <a:t>nomModule</a:t>
+            </a:r>
+            <a:r>
+              <a:rPr lang="fr-FR" b="1" dirty="0">
+                <a:latin typeface="Times New Roman" panose="02020603050405020304" pitchFamily="18" charset="0"/>
+                <a:cs typeface="Times New Roman" panose="02020603050405020304" pitchFamily="18" charset="0"/>
+              </a:rPr>
+              <a:t> import </a:t>
+            </a:r>
+            <a:r>
+              <a:rPr lang="fr-FR" b="1" dirty="0" err="1">
+                <a:latin typeface="Times New Roman" panose="02020603050405020304" pitchFamily="18" charset="0"/>
+                <a:cs typeface="Times New Roman" panose="02020603050405020304" pitchFamily="18" charset="0"/>
+              </a:rPr>
+              <a:t>nomFonction</a:t>
+            </a:r>
+            <a:r>
+              <a:rPr lang="fr-FR" b="1" dirty="0">
+                <a:latin typeface="Times New Roman" panose="02020603050405020304" pitchFamily="18" charset="0"/>
+                <a:cs typeface="Times New Roman" panose="02020603050405020304" pitchFamily="18" charset="0"/>
+              </a:rPr>
+              <a:t>,…</a:t>
+            </a:r>
+            <a:endParaRPr lang="fr-FR" dirty="0">
+              <a:latin typeface="Times New Roman" panose="02020603050405020304" pitchFamily="18" charset="0"/>
+              <a:cs typeface="Times New Roman" panose="02020603050405020304" pitchFamily="18" charset="0"/>
+            </a:endParaRPr>
+          </a:p>
+        </p:txBody>
+      </p:sp>
+      <p:sp>
+        <p:nvSpPr>
+          <p:cNvPr id="2" name="ZoneTexte 1">
+            <a:extLst>
+              <a:ext uri="{FF2B5EF4-FFF2-40B4-BE49-F238E27FC236}">
+                <a16:creationId xmlns:a16="http://schemas.microsoft.com/office/drawing/2014/main" id="{EBE7FC7C-0EA4-18FA-DE8E-0EA27EDE766D}"/>
+              </a:ext>
+            </a:extLst>
+          </p:cNvPr>
+          <p:cNvSpPr txBox="1"/>
+          <p:nvPr/>
+        </p:nvSpPr>
+        <p:spPr>
+          <a:xfrm>
+            <a:off x="500932" y="1682257"/>
+            <a:ext cx="11088982" cy="400110"/>
+          </a:xfrm>
+          <a:prstGeom prst="rect">
+            <a:avLst/>
+          </a:prstGeom>
+          <a:noFill/>
+        </p:spPr>
+        <p:txBody>
+          <a:bodyPr wrap="square" rtlCol="0">
+            <a:spAutoFit/>
+          </a:bodyPr>
+          <a:lstStyle>
+            <a:defPPr>
+              <a:defRPr lang="en-US"/>
+            </a:defPPr>
+            <a:lvl1pPr>
+              <a:defRPr sz="2000"/>
+            </a:lvl1pPr>
+          </a:lstStyle>
+          <a:p>
+            <a:r>
+              <a:rPr lang="fr-FR" dirty="0">
+                <a:latin typeface="Times New Roman" panose="02020603050405020304" pitchFamily="18" charset="0"/>
+                <a:cs typeface="Times New Roman" panose="02020603050405020304" pitchFamily="18" charset="0"/>
+              </a:rPr>
+              <a:t>Avec cette méthode, on a plus besoin de spécifier le nom du module quand on appelle la fonction.</a:t>
+            </a:r>
+          </a:p>
+        </p:txBody>
+      </p:sp>
+      <p:sp>
+        <p:nvSpPr>
+          <p:cNvPr id="7" name="ZoneTexte 6">
+            <a:extLst>
+              <a:ext uri="{FF2B5EF4-FFF2-40B4-BE49-F238E27FC236}">
+                <a16:creationId xmlns:a16="http://schemas.microsoft.com/office/drawing/2014/main" id="{D916796E-8CEE-64BD-CD10-DEE4A66713D5}"/>
+              </a:ext>
+            </a:extLst>
+          </p:cNvPr>
+          <p:cNvSpPr txBox="1"/>
+          <p:nvPr/>
+        </p:nvSpPr>
+        <p:spPr>
+          <a:xfrm>
+            <a:off x="397565" y="4383139"/>
+            <a:ext cx="11178449" cy="400110"/>
+          </a:xfrm>
+          <a:prstGeom prst="rect">
+            <a:avLst/>
+          </a:prstGeom>
+          <a:noFill/>
+        </p:spPr>
+        <p:txBody>
+          <a:bodyPr wrap="square" rtlCol="0">
+            <a:spAutoFit/>
+          </a:bodyPr>
+          <a:lstStyle>
+            <a:defPPr>
+              <a:defRPr lang="en-US"/>
+            </a:defPPr>
+            <a:lvl1pPr>
+              <a:defRPr sz="2000"/>
+            </a:lvl1pPr>
+          </a:lstStyle>
+          <a:p>
+            <a:r>
+              <a:rPr lang="fr-FR" dirty="0">
+                <a:latin typeface="Times New Roman" panose="02020603050405020304" pitchFamily="18" charset="0"/>
+                <a:cs typeface="Times New Roman" panose="02020603050405020304" pitchFamily="18" charset="0"/>
+              </a:rPr>
+              <a:t>Quand on veut importer toutes les fonctions d’un module, on utilise la syntaxe: </a:t>
+            </a:r>
+            <a:r>
+              <a:rPr lang="fr-FR" b="1" dirty="0" err="1">
+                <a:latin typeface="Times New Roman" panose="02020603050405020304" pitchFamily="18" charset="0"/>
+                <a:cs typeface="Times New Roman" panose="02020603050405020304" pitchFamily="18" charset="0"/>
+              </a:rPr>
+              <a:t>from</a:t>
+            </a:r>
+            <a:r>
+              <a:rPr lang="fr-FR" b="1" dirty="0">
+                <a:latin typeface="Times New Roman" panose="02020603050405020304" pitchFamily="18" charset="0"/>
+                <a:cs typeface="Times New Roman" panose="02020603050405020304" pitchFamily="18" charset="0"/>
+              </a:rPr>
+              <a:t> </a:t>
+            </a:r>
+            <a:r>
+              <a:rPr lang="fr-FR" b="1" dirty="0" err="1">
+                <a:latin typeface="Times New Roman" panose="02020603050405020304" pitchFamily="18" charset="0"/>
+                <a:cs typeface="Times New Roman" panose="02020603050405020304" pitchFamily="18" charset="0"/>
+              </a:rPr>
+              <a:t>nomModule</a:t>
+            </a:r>
+            <a:r>
+              <a:rPr lang="fr-FR" b="1" dirty="0">
+                <a:latin typeface="Times New Roman" panose="02020603050405020304" pitchFamily="18" charset="0"/>
+                <a:cs typeface="Times New Roman" panose="02020603050405020304" pitchFamily="18" charset="0"/>
+              </a:rPr>
+              <a:t> import *</a:t>
+            </a:r>
+            <a:r>
+              <a:rPr lang="fr-FR" dirty="0">
+                <a:latin typeface="Times New Roman" panose="02020603050405020304" pitchFamily="18" charset="0"/>
+                <a:cs typeface="Times New Roman" panose="02020603050405020304" pitchFamily="18" charset="0"/>
+              </a:rPr>
+              <a:t> </a:t>
+            </a:r>
+          </a:p>
+        </p:txBody>
+      </p:sp>
+      <p:pic>
+        <p:nvPicPr>
+          <p:cNvPr id="9" name="Image 8">
+            <a:extLst>
+              <a:ext uri="{FF2B5EF4-FFF2-40B4-BE49-F238E27FC236}">
+                <a16:creationId xmlns:a16="http://schemas.microsoft.com/office/drawing/2014/main" id="{A170EE43-EB7A-0426-AFEC-683F04558707}"/>
+              </a:ext>
+            </a:extLst>
+          </p:cNvPr>
+          <p:cNvPicPr>
+            <a:picLocks noChangeAspect="1"/>
+          </p:cNvPicPr>
+          <p:nvPr/>
+        </p:nvPicPr>
+        <p:blipFill>
+          <a:blip r:embed="rId2"/>
+          <a:stretch>
+            <a:fillRect/>
+          </a:stretch>
+        </p:blipFill>
+        <p:spPr>
+          <a:xfrm>
+            <a:off x="551509" y="2201160"/>
+            <a:ext cx="4141341" cy="2095682"/>
+          </a:xfrm>
+          <a:prstGeom prst="rect">
+            <a:avLst/>
+          </a:prstGeom>
+        </p:spPr>
+      </p:pic>
+      <p:pic>
+        <p:nvPicPr>
+          <p:cNvPr id="11" name="Image 10">
+            <a:extLst>
+              <a:ext uri="{FF2B5EF4-FFF2-40B4-BE49-F238E27FC236}">
+                <a16:creationId xmlns:a16="http://schemas.microsoft.com/office/drawing/2014/main" id="{FCD650A7-20E0-E221-85EF-17D95B233D80}"/>
+              </a:ext>
+            </a:extLst>
+          </p:cNvPr>
+          <p:cNvPicPr>
+            <a:picLocks noChangeAspect="1"/>
+          </p:cNvPicPr>
+          <p:nvPr/>
+        </p:nvPicPr>
+        <p:blipFill>
+          <a:blip r:embed="rId3"/>
+          <a:stretch>
+            <a:fillRect/>
+          </a:stretch>
+        </p:blipFill>
+        <p:spPr>
+          <a:xfrm>
+            <a:off x="4951082" y="2160624"/>
+            <a:ext cx="6728300" cy="2095682"/>
+          </a:xfrm>
+          <a:prstGeom prst="rect">
+            <a:avLst/>
+          </a:prstGeom>
+        </p:spPr>
+      </p:pic>
+      <p:pic>
+        <p:nvPicPr>
+          <p:cNvPr id="13" name="Image 12">
+            <a:extLst>
+              <a:ext uri="{FF2B5EF4-FFF2-40B4-BE49-F238E27FC236}">
+                <a16:creationId xmlns:a16="http://schemas.microsoft.com/office/drawing/2014/main" id="{B2FFBF53-8D4A-8D9F-E91D-805869DAE900}"/>
+              </a:ext>
+            </a:extLst>
+          </p:cNvPr>
+          <p:cNvPicPr>
+            <a:picLocks noChangeAspect="1"/>
+          </p:cNvPicPr>
+          <p:nvPr/>
+        </p:nvPicPr>
+        <p:blipFill>
+          <a:blip r:embed="rId4"/>
+          <a:stretch>
+            <a:fillRect/>
+          </a:stretch>
+        </p:blipFill>
+        <p:spPr>
+          <a:xfrm>
+            <a:off x="2814959" y="4727317"/>
+            <a:ext cx="4968671" cy="1508891"/>
+          </a:xfrm>
+          <a:prstGeom prst="rect">
+            <a:avLst/>
+          </a:prstGeom>
+        </p:spPr>
+      </p:pic>
     </p:spTree>
     <p:extLst>
       <p:ext uri="{BB962C8B-B14F-4D97-AF65-F5344CB8AC3E}">
@@ -7448,8 +7778,8 @@
         </p:nvSpPr>
         <p:spPr>
           <a:xfrm>
-            <a:off x="397565" y="218526"/>
-            <a:ext cx="4799124" cy="461665"/>
+            <a:off x="397564" y="218526"/>
+            <a:ext cx="5052621" cy="461665"/>
           </a:xfrm>
           <a:prstGeom prst="rect">
             <a:avLst/>
@@ -7467,7 +7797,7 @@
                 <a:latin typeface="Times New Roman" panose="02020603050405020304" pitchFamily="18" charset="0"/>
                 <a:cs typeface="Times New Roman" panose="02020603050405020304" pitchFamily="18" charset="0"/>
               </a:rPr>
-              <a:t>Exemple de création de module</a:t>
+              <a:t>Exercices</a:t>
             </a:r>
           </a:p>
         </p:txBody>
@@ -7513,10 +7843,10 @@
       </p:cxnSp>
       <p:sp>
         <p:nvSpPr>
-          <p:cNvPr id="22" name="ZoneTexte 21">
+          <p:cNvPr id="2" name="ZoneTexte 1">
             <a:extLst>
               <a:ext uri="{FF2B5EF4-FFF2-40B4-BE49-F238E27FC236}">
-                <a16:creationId xmlns:a16="http://schemas.microsoft.com/office/drawing/2014/main" id="{C3926A1A-9664-733A-6ADF-C5B314D8B1F9}"/>
+                <a16:creationId xmlns:a16="http://schemas.microsoft.com/office/drawing/2014/main" id="{30762B68-20AD-E048-3AB2-67EF1C3DE0A6}"/>
               </a:ext>
             </a:extLst>
           </p:cNvPr>
@@ -7525,8 +7855,46 @@
         </p:nvSpPr>
         <p:spPr>
           <a:xfrm>
-            <a:off x="500932" y="896114"/>
-            <a:ext cx="11088982" cy="400110"/>
+            <a:off x="397565" y="859559"/>
+            <a:ext cx="11569148" cy="400110"/>
+          </a:xfrm>
+          <a:prstGeom prst="rect">
+            <a:avLst/>
+          </a:prstGeom>
+          <a:noFill/>
+        </p:spPr>
+        <p:txBody>
+          <a:bodyPr wrap="square" rtlCol="0">
+            <a:spAutoFit/>
+          </a:bodyPr>
+          <a:lstStyle/>
+          <a:p>
+            <a:r>
+              <a:rPr lang="fr-FR" sz="2000" b="1" u="sng" dirty="0">
+                <a:latin typeface="Times New Roman" panose="02020603050405020304" pitchFamily="18" charset="0"/>
+                <a:cs typeface="Times New Roman" panose="02020603050405020304" pitchFamily="18" charset="0"/>
+              </a:rPr>
+              <a:t>Mini Projet 1</a:t>
+            </a:r>
+          </a:p>
+        </p:txBody>
+      </p:sp>
+      <p:sp>
+        <p:nvSpPr>
+          <p:cNvPr id="7" name="ZoneTexte 6">
+            <a:extLst>
+              <a:ext uri="{FF2B5EF4-FFF2-40B4-BE49-F238E27FC236}">
+                <a16:creationId xmlns:a16="http://schemas.microsoft.com/office/drawing/2014/main" id="{13C076C3-6118-3631-AFD0-D74872C44830}"/>
+              </a:ext>
+            </a:extLst>
+          </p:cNvPr>
+          <p:cNvSpPr txBox="1"/>
+          <p:nvPr/>
+        </p:nvSpPr>
+        <p:spPr>
+          <a:xfrm>
+            <a:off x="397564" y="1439036"/>
+            <a:ext cx="11088982" cy="4093428"/>
           </a:xfrm>
           <a:prstGeom prst="rect">
             <a:avLst/>
@@ -7551,7 +7919,249 @@
                 <a:latin typeface="Times New Roman" panose="02020603050405020304" pitchFamily="18" charset="0"/>
                 <a:cs typeface="Times New Roman" panose="02020603050405020304" pitchFamily="18" charset="0"/>
               </a:rPr>
-              <a:t>Page 49</a:t>
+              <a:t>Créer un module </a:t>
+            </a:r>
+            <a:r>
+              <a:rPr lang="fr-FR" b="1" dirty="0">
+                <a:latin typeface="Times New Roman" panose="02020603050405020304" pitchFamily="18" charset="0"/>
+                <a:cs typeface="Times New Roman" panose="02020603050405020304" pitchFamily="18" charset="0"/>
+              </a:rPr>
+              <a:t>multiplication</a:t>
+            </a:r>
+            <a:r>
+              <a:rPr lang="fr-FR" dirty="0">
+                <a:latin typeface="Times New Roman" panose="02020603050405020304" pitchFamily="18" charset="0"/>
+                <a:cs typeface="Times New Roman" panose="02020603050405020304" pitchFamily="18" charset="0"/>
+              </a:rPr>
+              <a:t> qui contiendra les fonctions suivantes:</a:t>
+            </a:r>
+          </a:p>
+          <a:p>
+            <a:pPr marL="342900" indent="-342900">
+              <a:buFont typeface="Arial" panose="020B0604020202020204" pitchFamily="34" charset="0"/>
+              <a:buChar char="•"/>
+            </a:pPr>
+            <a:r>
+              <a:rPr lang="fr-FR" dirty="0">
+                <a:latin typeface="Times New Roman" panose="02020603050405020304" pitchFamily="18" charset="0"/>
+                <a:cs typeface="Times New Roman" panose="02020603050405020304" pitchFamily="18" charset="0"/>
+              </a:rPr>
+              <a:t>addition(nbre1, nbre2): qui retourne le résultat de nbre1 + nbre2</a:t>
+            </a:r>
+          </a:p>
+          <a:p>
+            <a:pPr marL="342900" indent="-342900">
+              <a:buFont typeface="Arial" panose="020B0604020202020204" pitchFamily="34" charset="0"/>
+              <a:buChar char="•"/>
+            </a:pPr>
+            <a:r>
+              <a:rPr lang="fr-FR" dirty="0">
+                <a:latin typeface="Times New Roman" panose="02020603050405020304" pitchFamily="18" charset="0"/>
+                <a:cs typeface="Times New Roman" panose="02020603050405020304" pitchFamily="18" charset="0"/>
+              </a:rPr>
+              <a:t>soustraction(nbre1, nbre2): qui retourne le résultat de nbre1 - nbre2</a:t>
+            </a:r>
+          </a:p>
+          <a:p>
+            <a:pPr marL="342900" indent="-342900">
+              <a:buFont typeface="Arial" panose="020B0604020202020204" pitchFamily="34" charset="0"/>
+              <a:buChar char="•"/>
+            </a:pPr>
+            <a:r>
+              <a:rPr lang="fr-FR" dirty="0">
+                <a:latin typeface="Times New Roman" panose="02020603050405020304" pitchFamily="18" charset="0"/>
+                <a:cs typeface="Times New Roman" panose="02020603050405020304" pitchFamily="18" charset="0"/>
+              </a:rPr>
+              <a:t>multiplication(nbre1, nbre2): qui retourne le résultat de nbre1 * nbre2</a:t>
+            </a:r>
+          </a:p>
+          <a:p>
+            <a:pPr marL="342900" indent="-342900">
+              <a:buFont typeface="Arial" panose="020B0604020202020204" pitchFamily="34" charset="0"/>
+              <a:buChar char="•"/>
+            </a:pPr>
+            <a:r>
+              <a:rPr lang="fr-FR" dirty="0">
+                <a:latin typeface="Times New Roman" panose="02020603050405020304" pitchFamily="18" charset="0"/>
+                <a:cs typeface="Times New Roman" panose="02020603050405020304" pitchFamily="18" charset="0"/>
+              </a:rPr>
+              <a:t>division(nbre1, nbre2): qui retourne le résultat de nbre1 / nbre2 attention nbre2 doit être différent de 0</a:t>
+            </a:r>
+          </a:p>
+          <a:p>
+            <a:r>
+              <a:rPr lang="fr-FR" dirty="0">
+                <a:latin typeface="Times New Roman" panose="02020603050405020304" pitchFamily="18" charset="0"/>
+                <a:cs typeface="Times New Roman" panose="02020603050405020304" pitchFamily="18" charset="0"/>
+              </a:rPr>
+              <a:t>Créer un deuxième module </a:t>
+            </a:r>
+            <a:r>
+              <a:rPr lang="fr-FR" b="1" dirty="0">
+                <a:latin typeface="Times New Roman" panose="02020603050405020304" pitchFamily="18" charset="0"/>
+                <a:cs typeface="Times New Roman" panose="02020603050405020304" pitchFamily="18" charset="0"/>
+              </a:rPr>
+              <a:t>helper</a:t>
+            </a:r>
+            <a:r>
+              <a:rPr lang="fr-FR" dirty="0">
+                <a:latin typeface="Times New Roman" panose="02020603050405020304" pitchFamily="18" charset="0"/>
+                <a:cs typeface="Times New Roman" panose="02020603050405020304" pitchFamily="18" charset="0"/>
+              </a:rPr>
+              <a:t> qui contiendra les fonctions suivantes:</a:t>
+            </a:r>
+          </a:p>
+          <a:p>
+            <a:pPr marL="342900" indent="-342900">
+              <a:buFont typeface="Arial" panose="020B0604020202020204" pitchFamily="34" charset="0"/>
+              <a:buChar char="•"/>
+            </a:pPr>
+            <a:r>
+              <a:rPr lang="fr-FR" dirty="0" err="1">
+                <a:latin typeface="Times New Roman" panose="02020603050405020304" pitchFamily="18" charset="0"/>
+                <a:cs typeface="Times New Roman" panose="02020603050405020304" pitchFamily="18" charset="0"/>
+              </a:rPr>
+              <a:t>afficheMenu</a:t>
+            </a:r>
+            <a:r>
+              <a:rPr lang="fr-FR" dirty="0">
+                <a:latin typeface="Times New Roman" panose="02020603050405020304" pitchFamily="18" charset="0"/>
+                <a:cs typeface="Times New Roman" panose="02020603050405020304" pitchFamily="18" charset="0"/>
+              </a:rPr>
+              <a:t>(): qui affiche le menu des actions (addition, soustraction, multiplication, division)</a:t>
+            </a:r>
+          </a:p>
+          <a:p>
+            <a:pPr marL="342900" indent="-342900">
+              <a:buFont typeface="Arial" panose="020B0604020202020204" pitchFamily="34" charset="0"/>
+              <a:buChar char="•"/>
+            </a:pPr>
+            <a:r>
+              <a:rPr lang="fr-FR" dirty="0" err="1">
+                <a:latin typeface="Times New Roman" panose="02020603050405020304" pitchFamily="18" charset="0"/>
+                <a:cs typeface="Times New Roman" panose="02020603050405020304" pitchFamily="18" charset="0"/>
+              </a:rPr>
+              <a:t>saisirAction</a:t>
+            </a:r>
+            <a:r>
+              <a:rPr lang="fr-FR" dirty="0">
+                <a:latin typeface="Times New Roman" panose="02020603050405020304" pitchFamily="18" charset="0"/>
+                <a:cs typeface="Times New Roman" panose="02020603050405020304" pitchFamily="18" charset="0"/>
+              </a:rPr>
+              <a:t>(</a:t>
+            </a:r>
+            <a:r>
+              <a:rPr lang="fr-FR" dirty="0" err="1">
+                <a:latin typeface="Times New Roman" panose="02020603050405020304" pitchFamily="18" charset="0"/>
+                <a:cs typeface="Times New Roman" panose="02020603050405020304" pitchFamily="18" charset="0"/>
+              </a:rPr>
+              <a:t>minAction</a:t>
+            </a:r>
+            <a:r>
+              <a:rPr lang="fr-FR" dirty="0">
+                <a:latin typeface="Times New Roman" panose="02020603050405020304" pitchFamily="18" charset="0"/>
+                <a:cs typeface="Times New Roman" panose="02020603050405020304" pitchFamily="18" charset="0"/>
+              </a:rPr>
+              <a:t>, </a:t>
+            </a:r>
+            <a:r>
+              <a:rPr lang="fr-FR" dirty="0" err="1">
+                <a:latin typeface="Times New Roman" panose="02020603050405020304" pitchFamily="18" charset="0"/>
+                <a:cs typeface="Times New Roman" panose="02020603050405020304" pitchFamily="18" charset="0"/>
+              </a:rPr>
+              <a:t>maxAction</a:t>
+            </a:r>
+            <a:r>
+              <a:rPr lang="fr-FR" dirty="0">
+                <a:latin typeface="Times New Roman" panose="02020603050405020304" pitchFamily="18" charset="0"/>
+                <a:cs typeface="Times New Roman" panose="02020603050405020304" pitchFamily="18" charset="0"/>
+              </a:rPr>
+              <a:t>): qui demande le numéro de l’action à réaliser numéro compris entre </a:t>
+            </a:r>
+            <a:r>
+              <a:rPr lang="fr-FR" dirty="0" err="1">
+                <a:latin typeface="Times New Roman" panose="02020603050405020304" pitchFamily="18" charset="0"/>
+                <a:cs typeface="Times New Roman" panose="02020603050405020304" pitchFamily="18" charset="0"/>
+              </a:rPr>
+              <a:t>minAction</a:t>
+            </a:r>
+            <a:r>
+              <a:rPr lang="fr-FR" dirty="0">
+                <a:latin typeface="Times New Roman" panose="02020603050405020304" pitchFamily="18" charset="0"/>
+                <a:cs typeface="Times New Roman" panose="02020603050405020304" pitchFamily="18" charset="0"/>
+              </a:rPr>
+              <a:t> et </a:t>
+            </a:r>
+            <a:r>
+              <a:rPr lang="fr-FR" dirty="0" err="1">
+                <a:latin typeface="Times New Roman" panose="02020603050405020304" pitchFamily="18" charset="0"/>
+                <a:cs typeface="Times New Roman" panose="02020603050405020304" pitchFamily="18" charset="0"/>
+              </a:rPr>
+              <a:t>maxAction</a:t>
+            </a:r>
+            <a:r>
+              <a:rPr lang="fr-FR" dirty="0">
+                <a:latin typeface="Times New Roman" panose="02020603050405020304" pitchFamily="18" charset="0"/>
+                <a:cs typeface="Times New Roman" panose="02020603050405020304" pitchFamily="18" charset="0"/>
+              </a:rPr>
+              <a:t> par exemple dans notre cas çà sera entre 1 et 4</a:t>
+            </a:r>
+          </a:p>
+          <a:p>
+            <a:pPr marL="342900" indent="-342900">
+              <a:buFont typeface="Arial" panose="020B0604020202020204" pitchFamily="34" charset="0"/>
+              <a:buChar char="•"/>
+            </a:pPr>
+            <a:r>
+              <a:rPr lang="fr-FR" dirty="0" err="1">
+                <a:latin typeface="Times New Roman" panose="02020603050405020304" pitchFamily="18" charset="0"/>
+                <a:cs typeface="Times New Roman" panose="02020603050405020304" pitchFamily="18" charset="0"/>
+              </a:rPr>
+              <a:t>saisirNombre</a:t>
+            </a:r>
+            <a:r>
+              <a:rPr lang="fr-FR" dirty="0">
+                <a:latin typeface="Times New Roman" panose="02020603050405020304" pitchFamily="18" charset="0"/>
+                <a:cs typeface="Times New Roman" panose="02020603050405020304" pitchFamily="18" charset="0"/>
+              </a:rPr>
+              <a:t>(</a:t>
+            </a:r>
+            <a:r>
+              <a:rPr lang="fr-FR" dirty="0" err="1">
+                <a:latin typeface="Times New Roman" panose="02020603050405020304" pitchFamily="18" charset="0"/>
+                <a:cs typeface="Times New Roman" panose="02020603050405020304" pitchFamily="18" charset="0"/>
+              </a:rPr>
+              <a:t>typeNbre</a:t>
+            </a:r>
+            <a:r>
+              <a:rPr lang="fr-FR" dirty="0">
+                <a:latin typeface="Times New Roman" panose="02020603050405020304" pitchFamily="18" charset="0"/>
+                <a:cs typeface="Times New Roman" panose="02020603050405020304" pitchFamily="18" charset="0"/>
+              </a:rPr>
+              <a:t>): qui va demander à l’utilisateur de saisir un nombre </a:t>
+            </a:r>
+            <a:r>
+              <a:rPr lang="fr-FR" dirty="0" err="1">
+                <a:latin typeface="Times New Roman" panose="02020603050405020304" pitchFamily="18" charset="0"/>
+                <a:cs typeface="Times New Roman" panose="02020603050405020304" pitchFamily="18" charset="0"/>
+              </a:rPr>
+              <a:t>typeNbre</a:t>
+            </a:r>
+            <a:r>
+              <a:rPr lang="fr-FR" dirty="0">
+                <a:latin typeface="Times New Roman" panose="02020603050405020304" pitchFamily="18" charset="0"/>
+                <a:cs typeface="Times New Roman" panose="02020603050405020304" pitchFamily="18" charset="0"/>
+              </a:rPr>
+              <a:t> permet de dire si c’est le nombre 1 ou le nombre 2 qui doit être saisie.</a:t>
+            </a:r>
+          </a:p>
+          <a:p>
+            <a:r>
+              <a:rPr lang="fr-FR" dirty="0">
+                <a:latin typeface="Times New Roman" panose="02020603050405020304" pitchFamily="18" charset="0"/>
+                <a:cs typeface="Times New Roman" panose="02020603050405020304" pitchFamily="18" charset="0"/>
+              </a:rPr>
+              <a:t>Créer un fichier main.py qui va utiliser l’ensemble des fonctions des modules précédents pour faire réaliser une calculatrice simple.</a:t>
             </a:r>
           </a:p>
         </p:txBody>
@@ -7559,7 +8169,7 @@
     </p:spTree>
     <p:extLst>
       <p:ext uri="{BB962C8B-B14F-4D97-AF65-F5344CB8AC3E}">
-        <p14:creationId xmlns:p14="http://schemas.microsoft.com/office/powerpoint/2010/main" val="3830825058"/>
+        <p14:creationId xmlns:p14="http://schemas.microsoft.com/office/powerpoint/2010/main" val="335285156"/>
       </p:ext>
     </p:extLst>
   </p:cSld>
@@ -7754,7 +8364,212 @@
                 <a:latin typeface="Times New Roman" panose="02020603050405020304" pitchFamily="18" charset="0"/>
                 <a:cs typeface="Times New Roman" panose="02020603050405020304" pitchFamily="18" charset="0"/>
               </a:rPr>
-              <a:t>Exercice x</a:t>
+              <a:t>Mini Projet 2</a:t>
+            </a:r>
+          </a:p>
+        </p:txBody>
+      </p:sp>
+      <p:sp>
+        <p:nvSpPr>
+          <p:cNvPr id="7" name="ZoneTexte 6">
+            <a:extLst>
+              <a:ext uri="{FF2B5EF4-FFF2-40B4-BE49-F238E27FC236}">
+                <a16:creationId xmlns:a16="http://schemas.microsoft.com/office/drawing/2014/main" id="{13C076C3-6118-3631-AFD0-D74872C44830}"/>
+              </a:ext>
+            </a:extLst>
+          </p:cNvPr>
+          <p:cNvSpPr txBox="1"/>
+          <p:nvPr/>
+        </p:nvSpPr>
+        <p:spPr>
+          <a:xfrm>
+            <a:off x="397564" y="1219526"/>
+            <a:ext cx="11088982" cy="400110"/>
+          </a:xfrm>
+          <a:prstGeom prst="rect">
+            <a:avLst/>
+          </a:prstGeom>
+          <a:noFill/>
+        </p:spPr>
+        <p:txBody>
+          <a:bodyPr wrap="square" rtlCol="0">
+            <a:spAutoFit/>
+          </a:bodyPr>
+          <a:lstStyle>
+            <a:defPPr>
+              <a:defRPr lang="en-US"/>
+            </a:defPPr>
+            <a:lvl1pPr>
+              <a:defRPr sz="2000"/>
+            </a:lvl1pPr>
+          </a:lstStyle>
+          <a:p>
+            <a:r>
+              <a:rPr lang="fr-FR" dirty="0">
+                <a:latin typeface="Times New Roman" panose="02020603050405020304" pitchFamily="18" charset="0"/>
+                <a:cs typeface="Times New Roman" panose="02020603050405020304" pitchFamily="18" charset="0"/>
+              </a:rPr>
+              <a:t>En Python, pour générer un nombre aléatoire on utilise le module </a:t>
+            </a:r>
+            <a:r>
+              <a:rPr lang="fr-FR" b="1" dirty="0" err="1">
+                <a:latin typeface="Times New Roman" panose="02020603050405020304" pitchFamily="18" charset="0"/>
+                <a:cs typeface="Times New Roman" panose="02020603050405020304" pitchFamily="18" charset="0"/>
+              </a:rPr>
+              <a:t>random</a:t>
+            </a:r>
+            <a:r>
+              <a:rPr lang="fr-FR" dirty="0">
+                <a:latin typeface="Times New Roman" panose="02020603050405020304" pitchFamily="18" charset="0"/>
+                <a:cs typeface="Times New Roman" panose="02020603050405020304" pitchFamily="18" charset="0"/>
+              </a:rPr>
+              <a:t> comme ci-dessous:</a:t>
+            </a:r>
+          </a:p>
+        </p:txBody>
+      </p:sp>
+      <p:pic>
+        <p:nvPicPr>
+          <p:cNvPr id="9" name="Image 8">
+            <a:extLst>
+              <a:ext uri="{FF2B5EF4-FFF2-40B4-BE49-F238E27FC236}">
+                <a16:creationId xmlns:a16="http://schemas.microsoft.com/office/drawing/2014/main" id="{788D8C41-4AB6-1A52-C725-980EB49C08BA}"/>
+              </a:ext>
+            </a:extLst>
+          </p:cNvPr>
+          <p:cNvPicPr>
+            <a:picLocks noChangeAspect="1"/>
+          </p:cNvPicPr>
+          <p:nvPr/>
+        </p:nvPicPr>
+        <p:blipFill>
+          <a:blip r:embed="rId2"/>
+          <a:stretch>
+            <a:fillRect/>
+          </a:stretch>
+        </p:blipFill>
+        <p:spPr>
+          <a:xfrm>
+            <a:off x="3303726" y="1595015"/>
+            <a:ext cx="3787468" cy="891617"/>
+          </a:xfrm>
+          <a:prstGeom prst="rect">
+            <a:avLst/>
+          </a:prstGeom>
+        </p:spPr>
+      </p:pic>
+      <p:sp>
+        <p:nvSpPr>
+          <p:cNvPr id="10" name="ZoneTexte 9">
+            <a:extLst>
+              <a:ext uri="{FF2B5EF4-FFF2-40B4-BE49-F238E27FC236}">
+                <a16:creationId xmlns:a16="http://schemas.microsoft.com/office/drawing/2014/main" id="{D9083776-7EAD-5F3A-5C5B-F8F7EECBD3BE}"/>
+              </a:ext>
+            </a:extLst>
+          </p:cNvPr>
+          <p:cNvSpPr txBox="1"/>
+          <p:nvPr/>
+        </p:nvSpPr>
+        <p:spPr>
+          <a:xfrm>
+            <a:off x="397564" y="2492302"/>
+            <a:ext cx="11088982" cy="3477875"/>
+          </a:xfrm>
+          <a:prstGeom prst="rect">
+            <a:avLst/>
+          </a:prstGeom>
+          <a:noFill/>
+        </p:spPr>
+        <p:txBody>
+          <a:bodyPr wrap="square" rtlCol="0">
+            <a:spAutoFit/>
+          </a:bodyPr>
+          <a:lstStyle>
+            <a:defPPr>
+              <a:defRPr lang="en-US"/>
+            </a:defPPr>
+            <a:lvl1pPr>
+              <a:defRPr sz="2000"/>
+            </a:lvl1pPr>
+          </a:lstStyle>
+          <a:p>
+            <a:r>
+              <a:rPr lang="fr-FR" dirty="0">
+                <a:latin typeface="Times New Roman" panose="02020603050405020304" pitchFamily="18" charset="0"/>
+                <a:cs typeface="Times New Roman" panose="02020603050405020304" pitchFamily="18" charset="0"/>
+              </a:rPr>
+              <a:t>Le code précédent génère un nombre aléatoire entre 0 et 100 inclus.</a:t>
+            </a:r>
+          </a:p>
+          <a:p>
+            <a:r>
+              <a:rPr lang="fr-FR" dirty="0">
+                <a:latin typeface="Times New Roman" panose="02020603050405020304" pitchFamily="18" charset="0"/>
+                <a:cs typeface="Times New Roman" panose="02020603050405020304" pitchFamily="18" charset="0"/>
+              </a:rPr>
+              <a:t>Utilisez le code précédent, pour réaliser le mini-projet du nombre magique:</a:t>
+            </a:r>
+          </a:p>
+          <a:p>
+            <a:r>
+              <a:rPr lang="fr-FR">
+                <a:latin typeface="Times New Roman" panose="02020603050405020304" pitchFamily="18" charset="0"/>
+                <a:cs typeface="Times New Roman" panose="02020603050405020304" pitchFamily="18" charset="0"/>
+              </a:rPr>
+              <a:t>Coder </a:t>
+            </a:r>
+            <a:r>
+              <a:rPr lang="fr-FR" dirty="0">
+                <a:latin typeface="Times New Roman" panose="02020603050405020304" pitchFamily="18" charset="0"/>
+                <a:cs typeface="Times New Roman" panose="02020603050405020304" pitchFamily="18" charset="0"/>
+              </a:rPr>
+              <a:t>un jeu de nombre magique où l’utilisateur doit deviner un nombre aléatoire généré en 10 tentatives maximum. Le jeu doit être constitué de trois modes, le mode facile (nombre magique entre 0 et 100), le mode moyen (nombre magique entre 0 et 1000) et le mode difficile (nombre magique entre 0 et 10000).</a:t>
+            </a:r>
+          </a:p>
+          <a:p>
+            <a:r>
+              <a:rPr lang="fr-FR" dirty="0">
+                <a:latin typeface="Times New Roman" panose="02020603050405020304" pitchFamily="18" charset="0"/>
+                <a:cs typeface="Times New Roman" panose="02020603050405020304" pitchFamily="18" charset="0"/>
+              </a:rPr>
+              <a:t>Après choix du mode faire deviner le nombre magique à l’utilisateur quand l’utilisateur entre un nombre inférieur au nombre magique afficher « Le nombre magique est plus grand que </a:t>
+            </a:r>
+            <a:r>
+              <a:rPr lang="fr-FR" dirty="0" err="1">
+                <a:latin typeface="Times New Roman" panose="02020603050405020304" pitchFamily="18" charset="0"/>
+                <a:cs typeface="Times New Roman" panose="02020603050405020304" pitchFamily="18" charset="0"/>
+              </a:rPr>
+              <a:t>nombreSaisi</a:t>
+            </a:r>
+            <a:r>
+              <a:rPr lang="fr-FR" dirty="0">
+                <a:latin typeface="Times New Roman" panose="02020603050405020304" pitchFamily="18" charset="0"/>
+                <a:cs typeface="Times New Roman" panose="02020603050405020304" pitchFamily="18" charset="0"/>
+              </a:rPr>
+              <a:t> ». Quand l’utilisateur entre un nombre supérieur au nombre magique afficher « Le nombre magique est plus petit que </a:t>
+            </a:r>
+            <a:r>
+              <a:rPr lang="fr-FR" dirty="0" err="1">
+                <a:latin typeface="Times New Roman" panose="02020603050405020304" pitchFamily="18" charset="0"/>
+                <a:cs typeface="Times New Roman" panose="02020603050405020304" pitchFamily="18" charset="0"/>
+              </a:rPr>
+              <a:t>nombreSaisi</a:t>
+            </a:r>
+            <a:r>
+              <a:rPr lang="fr-FR" dirty="0">
+                <a:latin typeface="Times New Roman" panose="02020603050405020304" pitchFamily="18" charset="0"/>
+                <a:cs typeface="Times New Roman" panose="02020603050405020304" pitchFamily="18" charset="0"/>
+              </a:rPr>
+              <a:t> ». Sinon afficher « Bingo vous avez trouvé le nombre magique en x essais ». En cas d’ échec afficher un message d’échec et demander si l’utilisateur veut recommencer si oui réafficher le menu.</a:t>
+            </a:r>
+          </a:p>
+          <a:p>
+            <a:r>
+              <a:rPr lang="fr-FR" b="1" dirty="0">
+                <a:latin typeface="Times New Roman" panose="02020603050405020304" pitchFamily="18" charset="0"/>
+                <a:cs typeface="Times New Roman" panose="02020603050405020304" pitchFamily="18" charset="0"/>
+              </a:rPr>
+              <a:t>L’organisation des fonctions et modules est libre/</a:t>
             </a:r>
           </a:p>
         </p:txBody>
@@ -7762,7 +8577,7 @@
     </p:spTree>
     <p:extLst>
       <p:ext uri="{BB962C8B-B14F-4D97-AF65-F5344CB8AC3E}">
-        <p14:creationId xmlns:p14="http://schemas.microsoft.com/office/powerpoint/2010/main" val="335285156"/>
+        <p14:creationId xmlns:p14="http://schemas.microsoft.com/office/powerpoint/2010/main" val="116532967"/>
       </p:ext>
     </p:extLst>
   </p:cSld>

</xml_diff>

<commit_message>
Fix(chp6): Relecture et correction
Validation du chapitre 6
</commit_message>
<xml_diff>
--- a/source/Chapitre 6 - Les modules.pptx
+++ b/source/Chapitre 6 - Les modules.pptx
@@ -137,7 +137,7 @@
   <pc:docChgLst>
     <pc:chgData name="Ismaël Tuo" userId="fca7baf0e513a1e6" providerId="LiveId" clId="{A4091A3B-AF17-426D-A8E9-B493EC6BFBB7}"/>
     <pc:docChg chg="undo custSel addSld delSld modSld">
-      <pc:chgData name="Ismaël Tuo" userId="fca7baf0e513a1e6" providerId="LiveId" clId="{A4091A3B-AF17-426D-A8E9-B493EC6BFBB7}" dt="2023-10-14T13:53:54.207" v="6642" actId="20577"/>
+      <pc:chgData name="Ismaël Tuo" userId="fca7baf0e513a1e6" providerId="LiveId" clId="{A4091A3B-AF17-426D-A8E9-B493EC6BFBB7}" dt="2023-11-12T10:46:01.142" v="6792" actId="20577"/>
       <pc:docMkLst>
         <pc:docMk/>
       </pc:docMkLst>
@@ -187,7 +187,7 @@
         </pc:spChg>
       </pc:sldChg>
       <pc:sldChg chg="addSp delSp modSp mod">
-        <pc:chgData name="Ismaël Tuo" userId="fca7baf0e513a1e6" providerId="LiveId" clId="{A4091A3B-AF17-426D-A8E9-B493EC6BFBB7}" dt="2023-10-01T15:24:09.324" v="821" actId="20577"/>
+        <pc:chgData name="Ismaël Tuo" userId="fca7baf0e513a1e6" providerId="LiveId" clId="{A4091A3B-AF17-426D-A8E9-B493EC6BFBB7}" dt="2023-11-12T10:37:18.436" v="6651" actId="20577"/>
         <pc:sldMkLst>
           <pc:docMk/>
           <pc:sldMk cId="2639441608" sldId="286"/>
@@ -201,7 +201,7 @@
           </ac:spMkLst>
         </pc:spChg>
         <pc:spChg chg="add mod">
-          <ac:chgData name="Ismaël Tuo" userId="fca7baf0e513a1e6" providerId="LiveId" clId="{A4091A3B-AF17-426D-A8E9-B493EC6BFBB7}" dt="2023-10-01T15:23:15.661" v="816" actId="1076"/>
+          <ac:chgData name="Ismaël Tuo" userId="fca7baf0e513a1e6" providerId="LiveId" clId="{A4091A3B-AF17-426D-A8E9-B493EC6BFBB7}" dt="2023-11-12T10:37:18.436" v="6651" actId="20577"/>
           <ac:spMkLst>
             <pc:docMk/>
             <pc:sldMk cId="2639441608" sldId="286"/>
@@ -393,7 +393,7 @@
         </pc:sldMkLst>
       </pc:sldChg>
       <pc:sldChg chg="addSp delSp modSp mod">
-        <pc:chgData name="Ismaël Tuo" userId="fca7baf0e513a1e6" providerId="LiveId" clId="{A4091A3B-AF17-426D-A8E9-B493EC6BFBB7}" dt="2023-10-14T13:42:39.620" v="5040" actId="20577"/>
+        <pc:chgData name="Ismaël Tuo" userId="fca7baf0e513a1e6" providerId="LiveId" clId="{A4091A3B-AF17-426D-A8E9-B493EC6BFBB7}" dt="2023-11-12T10:44:52.257" v="6789" actId="20577"/>
         <pc:sldMkLst>
           <pc:docMk/>
           <pc:sldMk cId="335285156" sldId="296"/>
@@ -407,7 +407,7 @@
           </ac:spMkLst>
         </pc:spChg>
         <pc:spChg chg="add mod">
-          <ac:chgData name="Ismaël Tuo" userId="fca7baf0e513a1e6" providerId="LiveId" clId="{A4091A3B-AF17-426D-A8E9-B493EC6BFBB7}" dt="2023-10-14T13:38:56.495" v="5036"/>
+          <ac:chgData name="Ismaël Tuo" userId="fca7baf0e513a1e6" providerId="LiveId" clId="{A4091A3B-AF17-426D-A8E9-B493EC6BFBB7}" dt="2023-11-12T10:44:52.257" v="6789" actId="20577"/>
           <ac:spMkLst>
             <pc:docMk/>
             <pc:sldMk cId="335285156" sldId="296"/>
@@ -440,7 +440,7 @@
         </pc:spChg>
       </pc:sldChg>
       <pc:sldChg chg="addSp delSp modSp add mod">
-        <pc:chgData name="Ismaël Tuo" userId="fca7baf0e513a1e6" providerId="LiveId" clId="{A4091A3B-AF17-426D-A8E9-B493EC6BFBB7}" dt="2023-10-01T15:33:01.621" v="1288" actId="1076"/>
+        <pc:chgData name="Ismaël Tuo" userId="fca7baf0e513a1e6" providerId="LiveId" clId="{A4091A3B-AF17-426D-A8E9-B493EC6BFBB7}" dt="2023-11-12T10:39:16.173" v="6679" actId="1076"/>
         <pc:sldMkLst>
           <pc:docMk/>
           <pc:sldMk cId="790842746" sldId="297"/>
@@ -470,7 +470,7 @@
           </ac:spMkLst>
         </pc:spChg>
         <pc:spChg chg="mod">
-          <ac:chgData name="Ismaël Tuo" userId="fca7baf0e513a1e6" providerId="LiveId" clId="{A4091A3B-AF17-426D-A8E9-B493EC6BFBB7}" dt="2023-10-01T15:33:01.621" v="1288" actId="1076"/>
+          <ac:chgData name="Ismaël Tuo" userId="fca7baf0e513a1e6" providerId="LiveId" clId="{A4091A3B-AF17-426D-A8E9-B493EC6BFBB7}" dt="2023-11-12T10:39:11.621" v="6678" actId="20577"/>
           <ac:spMkLst>
             <pc:docMk/>
             <pc:sldMk cId="790842746" sldId="297"/>
@@ -526,7 +526,7 @@
           </ac:spMkLst>
         </pc:spChg>
         <pc:picChg chg="add mod">
-          <ac:chgData name="Ismaël Tuo" userId="fca7baf0e513a1e6" providerId="LiveId" clId="{A4091A3B-AF17-426D-A8E9-B493EC6BFBB7}" dt="2023-10-01T15:32:37.592" v="1287" actId="1076"/>
+          <ac:chgData name="Ismaël Tuo" userId="fca7baf0e513a1e6" providerId="LiveId" clId="{A4091A3B-AF17-426D-A8E9-B493EC6BFBB7}" dt="2023-11-12T10:39:16.173" v="6679" actId="1076"/>
           <ac:picMkLst>
             <pc:docMk/>
             <pc:sldMk cId="790842746" sldId="297"/>
@@ -565,7 +565,7 @@
         </pc:sldMkLst>
       </pc:sldChg>
       <pc:sldChg chg="addSp delSp modSp add mod">
-        <pc:chgData name="Ismaël Tuo" userId="fca7baf0e513a1e6" providerId="LiveId" clId="{A4091A3B-AF17-426D-A8E9-B493EC6BFBB7}" dt="2023-10-01T16:02:42.021" v="3264" actId="1076"/>
+        <pc:chgData name="Ismaël Tuo" userId="fca7baf0e513a1e6" providerId="LiveId" clId="{A4091A3B-AF17-426D-A8E9-B493EC6BFBB7}" dt="2023-11-12T10:42:10.123" v="6777" actId="1076"/>
         <pc:sldMkLst>
           <pc:docMk/>
           <pc:sldMk cId="3451309311" sldId="298"/>
@@ -643,7 +643,7 @@
           </ac:picMkLst>
         </pc:picChg>
         <pc:picChg chg="add mod">
-          <ac:chgData name="Ismaël Tuo" userId="fca7baf0e513a1e6" providerId="LiveId" clId="{A4091A3B-AF17-426D-A8E9-B493EC6BFBB7}" dt="2023-10-01T16:01:31.753" v="3259" actId="1076"/>
+          <ac:chgData name="Ismaël Tuo" userId="fca7baf0e513a1e6" providerId="LiveId" clId="{A4091A3B-AF17-426D-A8E9-B493EC6BFBB7}" dt="2023-11-12T10:42:08.669" v="6776" actId="1076"/>
           <ac:picMkLst>
             <pc:docMk/>
             <pc:sldMk cId="3451309311" sldId="298"/>
@@ -651,7 +651,7 @@
           </ac:picMkLst>
         </pc:picChg>
         <pc:picChg chg="add mod">
-          <ac:chgData name="Ismaël Tuo" userId="fca7baf0e513a1e6" providerId="LiveId" clId="{A4091A3B-AF17-426D-A8E9-B493EC6BFBB7}" dt="2023-10-01T16:01:29.954" v="3258" actId="1076"/>
+          <ac:chgData name="Ismaël Tuo" userId="fca7baf0e513a1e6" providerId="LiveId" clId="{A4091A3B-AF17-426D-A8E9-B493EC6BFBB7}" dt="2023-11-12T10:42:10.123" v="6777" actId="1076"/>
           <ac:picMkLst>
             <pc:docMk/>
             <pc:sldMk cId="3451309311" sldId="298"/>
@@ -675,13 +675,13 @@
         </pc:spChg>
       </pc:sldChg>
       <pc:sldChg chg="addSp delSp modSp add mod">
-        <pc:chgData name="Ismaël Tuo" userId="fca7baf0e513a1e6" providerId="LiveId" clId="{A4091A3B-AF17-426D-A8E9-B493EC6BFBB7}" dt="2023-10-01T15:44:05.306" v="2048" actId="20577"/>
+        <pc:chgData name="Ismaël Tuo" userId="fca7baf0e513a1e6" providerId="LiveId" clId="{A4091A3B-AF17-426D-A8E9-B493EC6BFBB7}" dt="2023-11-12T10:41:04.670" v="6775" actId="20577"/>
         <pc:sldMkLst>
           <pc:docMk/>
           <pc:sldMk cId="2314930706" sldId="300"/>
         </pc:sldMkLst>
         <pc:spChg chg="add mod">
-          <ac:chgData name="Ismaël Tuo" userId="fca7baf0e513a1e6" providerId="LiveId" clId="{A4091A3B-AF17-426D-A8E9-B493EC6BFBB7}" dt="2023-10-01T15:44:05.306" v="2048" actId="20577"/>
+          <ac:chgData name="Ismaël Tuo" userId="fca7baf0e513a1e6" providerId="LiveId" clId="{A4091A3B-AF17-426D-A8E9-B493EC6BFBB7}" dt="2023-11-12T10:41:04.670" v="6775" actId="20577"/>
           <ac:spMkLst>
             <pc:docMk/>
             <pc:sldMk cId="2314930706" sldId="300"/>
@@ -689,7 +689,7 @@
           </ac:spMkLst>
         </pc:spChg>
         <pc:spChg chg="mod">
-          <ac:chgData name="Ismaël Tuo" userId="fca7baf0e513a1e6" providerId="LiveId" clId="{A4091A3B-AF17-426D-A8E9-B493EC6BFBB7}" dt="2023-10-01T15:39:11.890" v="1742" actId="14100"/>
+          <ac:chgData name="Ismaël Tuo" userId="fca7baf0e513a1e6" providerId="LiveId" clId="{A4091A3B-AF17-426D-A8E9-B493EC6BFBB7}" dt="2023-11-12T10:39:48.397" v="6700" actId="20577"/>
           <ac:spMkLst>
             <pc:docMk/>
             <pc:sldMk cId="2314930706" sldId="300"/>
@@ -769,7 +769,7 @@
         </pc:picChg>
       </pc:sldChg>
       <pc:sldChg chg="addSp modSp add mod">
-        <pc:chgData name="Ismaël Tuo" userId="fca7baf0e513a1e6" providerId="LiveId" clId="{A4091A3B-AF17-426D-A8E9-B493EC6BFBB7}" dt="2023-10-14T13:53:54.207" v="6642" actId="20577"/>
+        <pc:chgData name="Ismaël Tuo" userId="fca7baf0e513a1e6" providerId="LiveId" clId="{A4091A3B-AF17-426D-A8E9-B493EC6BFBB7}" dt="2023-11-12T10:46:01.142" v="6792" actId="20577"/>
         <pc:sldMkLst>
           <pc:docMk/>
           <pc:sldMk cId="116532967" sldId="302"/>
@@ -791,7 +791,7 @@
           </ac:spMkLst>
         </pc:spChg>
         <pc:spChg chg="add mod">
-          <ac:chgData name="Ismaël Tuo" userId="fca7baf0e513a1e6" providerId="LiveId" clId="{A4091A3B-AF17-426D-A8E9-B493EC6BFBB7}" dt="2023-10-14T13:53:54.207" v="6642" actId="20577"/>
+          <ac:chgData name="Ismaël Tuo" userId="fca7baf0e513a1e6" providerId="LiveId" clId="{A4091A3B-AF17-426D-A8E9-B493EC6BFBB7}" dt="2023-11-12T10:46:01.142" v="6792" actId="20577"/>
           <ac:spMkLst>
             <pc:docMk/>
             <pc:sldMk cId="116532967" sldId="302"/>
@@ -894,7 +894,7 @@
           <a:p>
             <a:fld id="{5D1B8971-FAD5-A544-A565-5C81831E2E08}" type="datetimeFigureOut">
               <a:rPr lang="fr-FR" smtClean="0"/>
-              <a:t>14/10/2023</a:t>
+              <a:t>12/11/2023</a:t>
             </a:fld>
             <a:endParaRPr lang="fr-FR"/>
           </a:p>
@@ -1324,7 +1324,7 @@
           <a:p>
             <a:fld id="{446AF453-C717-E044-9B61-C449088DBB9F}" type="datetime1">
               <a:rPr lang="fr-FR" smtClean="0"/>
-              <a:t>14/10/2023</a:t>
+              <a:t>12/11/2023</a:t>
             </a:fld>
             <a:endParaRPr lang="fr-FR"/>
           </a:p>
@@ -1498,7 +1498,7 @@
           <a:p>
             <a:fld id="{0AD74B8B-4B66-A54B-A7E1-EB9F6C09CE67}" type="datetime1">
               <a:rPr lang="fr-FR" smtClean="0"/>
-              <a:t>14/10/2023</a:t>
+              <a:t>12/11/2023</a:t>
             </a:fld>
             <a:endParaRPr lang="fr-FR"/>
           </a:p>
@@ -1682,7 +1682,7 @@
           <a:p>
             <a:fld id="{9584F9F2-42A0-CD42-8013-986AEAF97421}" type="datetime1">
               <a:rPr lang="fr-FR" smtClean="0"/>
-              <a:t>14/10/2023</a:t>
+              <a:t>12/11/2023</a:t>
             </a:fld>
             <a:endParaRPr lang="fr-FR"/>
           </a:p>
@@ -1856,7 +1856,7 @@
           <a:p>
             <a:fld id="{DAB9BD9F-3179-BB4C-96AB-C40862581685}" type="datetime1">
               <a:rPr lang="fr-FR" smtClean="0"/>
-              <a:t>14/10/2023</a:t>
+              <a:t>12/11/2023</a:t>
             </a:fld>
             <a:endParaRPr lang="fr-FR"/>
           </a:p>
@@ -2128,7 +2128,7 @@
           <a:p>
             <a:fld id="{A664DE96-64FF-BC43-8A9C-18ED43A528D6}" type="datetime1">
               <a:rPr lang="fr-FR" smtClean="0"/>
-              <a:t>14/10/2023</a:t>
+              <a:t>12/11/2023</a:t>
             </a:fld>
             <a:endParaRPr lang="fr-FR"/>
           </a:p>
@@ -2364,7 +2364,7 @@
           <a:p>
             <a:fld id="{2C8FE800-9F9B-1C4F-A1CD-9EF46842C4CA}" type="datetime1">
               <a:rPr lang="fr-FR" smtClean="0"/>
-              <a:t>14/10/2023</a:t>
+              <a:t>12/11/2023</a:t>
             </a:fld>
             <a:endParaRPr lang="fr-FR"/>
           </a:p>
@@ -2727,7 +2727,7 @@
           <a:p>
             <a:fld id="{0F7DED4E-8CB4-EF40-A349-EFC02EC7784E}" type="datetime1">
               <a:rPr lang="fr-FR" smtClean="0"/>
-              <a:t>14/10/2023</a:t>
+              <a:t>12/11/2023</a:t>
             </a:fld>
             <a:endParaRPr lang="fr-FR"/>
           </a:p>
@@ -2872,7 +2872,7 @@
           <a:p>
             <a:fld id="{5BB88D77-E8A2-E24F-81D2-817E60779F3E}" type="datetime1">
               <a:rPr lang="fr-FR" smtClean="0"/>
-              <a:t>14/10/2023</a:t>
+              <a:t>12/11/2023</a:t>
             </a:fld>
             <a:endParaRPr lang="fr-FR"/>
           </a:p>
@@ -2971,7 +2971,7 @@
           <a:p>
             <a:fld id="{817F964E-5B57-884A-A1B8-925BFA5276AF}" type="datetime1">
               <a:rPr lang="fr-FR" smtClean="0"/>
-              <a:t>14/10/2023</a:t>
+              <a:t>12/11/2023</a:t>
             </a:fld>
             <a:endParaRPr lang="fr-FR"/>
           </a:p>
@@ -3332,7 +3332,7 @@
           <a:p>
             <a:fld id="{D5636CD0-A2E6-1543-A0E5-C829C16FEE55}" type="datetime1">
               <a:rPr lang="fr-FR" smtClean="0"/>
-              <a:t>14/10/2023</a:t>
+              <a:t>12/11/2023</a:t>
             </a:fld>
             <a:endParaRPr lang="fr-FR"/>
           </a:p>
@@ -3693,7 +3693,7 @@
           <a:p>
             <a:fld id="{CEE5CE4A-5B1A-1846-BA66-722BDB7A9525}" type="datetime1">
               <a:rPr lang="fr-FR" smtClean="0"/>
-              <a:t>14/10/2023</a:t>
+              <a:t>12/11/2023</a:t>
             </a:fld>
             <a:endParaRPr lang="fr-FR"/>
           </a:p>
@@ -3940,7 +3940,7 @@
           <a:p>
             <a:fld id="{55A13D9C-CA6E-9C45-8634-4423EBFFD553}" type="datetime1">
               <a:rPr lang="fr-FR" smtClean="0"/>
-              <a:t>14/10/2023</a:t>
+              <a:t>12/11/2023</a:t>
             </a:fld>
             <a:endParaRPr lang="fr-FR"/>
           </a:p>
@@ -5831,7 +5831,7 @@
                 <a:latin typeface="Times New Roman" panose="02020603050405020304" pitchFamily="18" charset="0"/>
                 <a:cs typeface="Times New Roman" panose="02020603050405020304" pitchFamily="18" charset="0"/>
               </a:rPr>
-              <a:t>Un module en Python identifie ses fonctions par leurs signatures qui est le nom de la fonction, donc lors de la création d’un module il faut veiller à ne pas avoir deux fonctions différentes avec le même nom.</a:t>
+              <a:t>Un module en Python identifie ses fonctions par leurs signatures qui est le nom de la fonction. Lors de la création d’un module il faut veiller à ne pas avoir deux fonctions différentes avec le même nom.</a:t>
             </a:r>
           </a:p>
         </p:txBody>
@@ -6061,7 +6061,7 @@
         <p:spPr>
           <a:xfrm>
             <a:off x="500932" y="788152"/>
-            <a:ext cx="11088982" cy="1015663"/>
+            <a:ext cx="11088982" cy="1323439"/>
           </a:xfrm>
           <a:prstGeom prst="rect">
             <a:avLst/>
@@ -6130,7 +6130,7 @@
                 <a:latin typeface="Times New Roman" panose="02020603050405020304" pitchFamily="18" charset="0"/>
                 <a:cs typeface="Times New Roman" panose="02020603050405020304" pitchFamily="18" charset="0"/>
               </a:rPr>
-              <a:t> ne sont pas chargés par défaut quand on démarre l’interpréteur de Python. Pour utiliser les fonctions du module </a:t>
+              <a:t> ne sont pas chargés par défaut quand on démarre l’interpréteur de Python. Par exemple, pour utiliser les fonctions du module </a:t>
             </a:r>
             <a:r>
               <a:rPr lang="fr-FR" b="1" dirty="0">
@@ -6171,7 +6171,7 @@
         </p:blipFill>
         <p:spPr>
           <a:xfrm>
-            <a:off x="2082299" y="1911777"/>
+            <a:off x="2353903" y="2068193"/>
             <a:ext cx="6192569" cy="4109616"/>
           </a:xfrm>
           <a:prstGeom prst="rect">
@@ -6384,7 +6384,7 @@
                 <a:latin typeface="Times New Roman" panose="02020603050405020304" pitchFamily="18" charset="0"/>
                 <a:cs typeface="Times New Roman" panose="02020603050405020304" pitchFamily="18" charset="0"/>
               </a:rPr>
-              <a:t>Quand on importe un module, pour utiliser une fonction du module, il faut précéder la fonction du nom du module. Par exemple pour avoir le carré d’un nombre avec la fonction </a:t>
+              <a:t>Quand on importe un module pour utiliser une de ses fonctions, il faut précéder la fonction du nom du module. Par exemple pour avoir le carré d’un nombre avec la fonction </a:t>
             </a:r>
             <a:r>
               <a:rPr lang="fr-FR" b="1" dirty="0" err="1">
@@ -6468,8 +6468,8 @@
         </p:nvSpPr>
         <p:spPr>
           <a:xfrm>
-            <a:off x="500930" y="5033045"/>
-            <a:ext cx="11178450" cy="1015663"/>
+            <a:off x="500931" y="4918927"/>
+            <a:ext cx="11178450" cy="1323439"/>
           </a:xfrm>
           <a:prstGeom prst="rect">
             <a:avLst/>
@@ -6515,13 +6515,27 @@
                 <a:latin typeface="Times New Roman" panose="02020603050405020304" pitchFamily="18" charset="0"/>
                 <a:cs typeface="Times New Roman" panose="02020603050405020304" pitchFamily="18" charset="0"/>
               </a:rPr>
-              <a:t>avant de l’utiliser quand on connait déjà le rôle de la fonction on peut s’en passer. Quand on veut afficher la documentation il faut éviter de mettre les parenthèses dans help du type </a:t>
+              <a:t>avant de l’utiliser quand on connait déjà le rôle de la fonction on peut s’en passer. Quand on veut afficher la documentation il faut éviter de mettre les parenthèses dans lors de l’utilisation de </a:t>
             </a:r>
             <a:r>
               <a:rPr lang="fr-FR" b="1" dirty="0">
                 <a:latin typeface="Times New Roman" panose="02020603050405020304" pitchFamily="18" charset="0"/>
                 <a:cs typeface="Times New Roman" panose="02020603050405020304" pitchFamily="18" charset="0"/>
               </a:rPr>
+              <a:t>help</a:t>
+            </a:r>
+            <a:r>
+              <a:rPr lang="fr-FR" dirty="0">
+                <a:latin typeface="Times New Roman" panose="02020603050405020304" pitchFamily="18" charset="0"/>
+                <a:cs typeface="Times New Roman" panose="02020603050405020304" pitchFamily="18" charset="0"/>
+              </a:rPr>
+              <a:t> du type </a:t>
+            </a:r>
+            <a:r>
+              <a:rPr lang="fr-FR" b="1" dirty="0">
+                <a:latin typeface="Times New Roman" panose="02020603050405020304" pitchFamily="18" charset="0"/>
+                <a:cs typeface="Times New Roman" panose="02020603050405020304" pitchFamily="18" charset="0"/>
+              </a:rPr>
               <a:t>help(</a:t>
             </a:r>
             <a:r>
@@ -6543,10 +6557,10 @@
                 <a:latin typeface="Times New Roman" panose="02020603050405020304" pitchFamily="18" charset="0"/>
                 <a:cs typeface="Times New Roman" panose="02020603050405020304" pitchFamily="18" charset="0"/>
               </a:rPr>
-              <a:t>qui n’affiche pas la doc de la fonction </a:t>
-            </a:r>
-            <a:r>
-              <a:rPr lang="fr-FR" dirty="0" err="1">
+              <a:t>qui n’affiche pas la documentation de la fonction </a:t>
+            </a:r>
+            <a:r>
+              <a:rPr lang="fr-FR" b="1" dirty="0" err="1">
                 <a:latin typeface="Times New Roman" panose="02020603050405020304" pitchFamily="18" charset="0"/>
                 <a:cs typeface="Times New Roman" panose="02020603050405020304" pitchFamily="18" charset="0"/>
               </a:rPr>
@@ -7153,7 +7167,7 @@
         </p:blipFill>
         <p:spPr>
           <a:xfrm>
-            <a:off x="958880" y="4430671"/>
+            <a:off x="913613" y="4391319"/>
             <a:ext cx="3939881" cy="1577477"/>
           </a:xfrm>
           <a:prstGeom prst="rect">
@@ -7183,7 +7197,7 @@
         </p:blipFill>
         <p:spPr>
           <a:xfrm>
-            <a:off x="6476111" y="4430672"/>
+            <a:off x="6476111" y="4366586"/>
             <a:ext cx="4282811" cy="1577477"/>
           </a:xfrm>
           <a:prstGeom prst="rect">
@@ -7728,7 +7742,7 @@
           <a:lstStyle/>
           <a:p>
             <a:r>
-              <a:rPr lang="fr-FR"/>
+              <a:rPr lang="fr-FR" dirty="0"/>
               <a:t>Cours: Python | Auteur: TUO N. Ismaël Maurice 
 </a:t>
             </a:r>
@@ -8152,7 +8166,7 @@
                 <a:latin typeface="Times New Roman" panose="02020603050405020304" pitchFamily="18" charset="0"/>
                 <a:cs typeface="Times New Roman" panose="02020603050405020304" pitchFamily="18" charset="0"/>
               </a:rPr>
-              <a:t> permet de dire si c’est le nombre 1 ou le nombre 2 qui doit être saisie.</a:t>
+              <a:t> permet de dire si c’est le nombre 1 ou le nombre 2 qui doit être renseigné.</a:t>
             </a:r>
           </a:p>
           <a:p>
@@ -8512,18 +8526,11 @@
           </a:p>
           <a:p>
             <a:r>
-              <a:rPr lang="fr-FR">
-                <a:latin typeface="Times New Roman" panose="02020603050405020304" pitchFamily="18" charset="0"/>
-                <a:cs typeface="Times New Roman" panose="02020603050405020304" pitchFamily="18" charset="0"/>
-              </a:rPr>
-              <a:t>Coder </a:t>
-            </a:r>
-            <a:r>
               <a:rPr lang="fr-FR" dirty="0">
                 <a:latin typeface="Times New Roman" panose="02020603050405020304" pitchFamily="18" charset="0"/>
                 <a:cs typeface="Times New Roman" panose="02020603050405020304" pitchFamily="18" charset="0"/>
               </a:rPr>
-              <a:t>un jeu de nombre magique où l’utilisateur doit deviner un nombre aléatoire généré en 10 tentatives maximum. Le jeu doit être constitué de trois modes, le mode facile (nombre magique entre 0 et 100), le mode moyen (nombre magique entre 0 et 1000) et le mode difficile (nombre magique entre 0 et 10000).</a:t>
+              <a:t>Coder un jeu de nombre magique où l’utilisateur doit deviner un nombre aléatoire généré en 10 tentatives maximum. Le jeu doit être constitué de trois modes, le mode facile (nombre magique entre 0 et 100), le mode moyen (nombre magique entre 0 et 1000) et le mode difficile (nombre magique entre 0 et 10000).</a:t>
             </a:r>
           </a:p>
           <a:p>
@@ -8560,7 +8567,7 @@
                 <a:latin typeface="Times New Roman" panose="02020603050405020304" pitchFamily="18" charset="0"/>
                 <a:cs typeface="Times New Roman" panose="02020603050405020304" pitchFamily="18" charset="0"/>
               </a:rPr>
-              <a:t> ». Sinon afficher « Bingo vous avez trouvé le nombre magique en x essais ». En cas d’ échec afficher un message d’échec et demander si l’utilisateur veut recommencer si oui réafficher le menu.</a:t>
+              <a:t> ». Sinon afficher « Bingo vous avez trouvé le nombre magique en x essais ». En cas d’échec afficher un message d’échec et demander si l’utilisateur veut recommencer si oui réafficher le menu.</a:t>
             </a:r>
           </a:p>
           <a:p>
@@ -8569,7 +8576,7 @@
                 <a:latin typeface="Times New Roman" panose="02020603050405020304" pitchFamily="18" charset="0"/>
                 <a:cs typeface="Times New Roman" panose="02020603050405020304" pitchFamily="18" charset="0"/>
               </a:rPr>
-              <a:t>L’organisation des fonctions et modules est libre/</a:t>
+              <a:t>L’organisation des fonctions et modules est libre.</a:t>
             </a:r>
           </a:p>
         </p:txBody>

</xml_diff>